<commit_message>
Trabalho finalizado - Ajuste final na documentação do Poster para apresentação no Demoday
</commit_message>
<xml_diff>
--- a/docs/TEMPLATE_POSTER_PORTIFOLIO_MEDGESTOR.pptx
+++ b/docs/TEMPLATE_POSTER_PORTIFOLIO_MEDGESTOR.pptx
@@ -6507,21 +6507,58 @@
                 <a:latin typeface="Arial"/>
                 <a:cs typeface="Arial"/>
               </a:rPr>
-              <a:t>Nome Completo </a:t>
+              <a:t>Thiago de Freitas Saraiva </a:t>
             </a:r>
           </a:p>
           <a:p>
             <a:pPr algn="ctr"/>
             <a:r>
-              <a:rPr lang="es-ES_tradnl" altLang="pt-BR" sz="3200" b="1" i="1" dirty="0">
+              <a:rPr lang="es-ES_tradnl" altLang="pt-BR" sz="3200" b="1" i="1">
                 <a:solidFill>
                   <a:srgbClr val="000099"/>
                 </a:solidFill>
                 <a:latin typeface="Arial"/>
                 <a:cs typeface="Arial"/>
               </a:rPr>
-              <a:t>aluno@edu.catolicasc.org.br</a:t>
-            </a:r>
+              <a:t>thiago</a:t>
+            </a:r>
+            <a:r>
+              <a:rPr lang="es-ES_tradnl" altLang="pt-BR" sz="3200" b="1" i="1" dirty="0" err="1">
+                <a:solidFill>
+                  <a:srgbClr val="000099"/>
+                </a:solidFill>
+                <a:latin typeface="Arial"/>
+                <a:cs typeface="Arial"/>
+              </a:rPr>
+              <a:t>.</a:t>
+            </a:r>
+            <a:r>
+              <a:rPr lang="es-ES_tradnl" altLang="pt-BR" sz="3200" b="1" i="1" err="1">
+                <a:solidFill>
+                  <a:srgbClr val="000099"/>
+                </a:solidFill>
+                <a:latin typeface="Arial"/>
+                <a:cs typeface="Arial"/>
+              </a:rPr>
+              <a:t>saraiva</a:t>
+            </a:r>
+            <a:r>
+              <a:rPr lang="es-ES_tradnl" altLang="pt-BR" sz="3200" b="1" i="1">
+                <a:solidFill>
+                  <a:srgbClr val="000099"/>
+                </a:solidFill>
+                <a:latin typeface="Arial"/>
+                <a:cs typeface="Arial"/>
+              </a:rPr>
+              <a:t>@catolicasc.edu.br</a:t>
+            </a:r>
+            <a:endParaRPr lang="es-ES_tradnl" altLang="pt-BR" sz="3200" b="1" i="1" dirty="0">
+              <a:solidFill>
+                <a:srgbClr val="000099"/>
+              </a:solidFill>
+              <a:latin typeface="Arial"/>
+              <a:cs typeface="Arial"/>
+            </a:endParaRPr>
           </a:p>
           <a:p>
             <a:pPr algn="ctr"/>
@@ -6561,7 +6598,7 @@
         </p:nvSpPr>
         <p:spPr bwMode="auto">
           <a:xfrm>
-            <a:off x="18041938" y="29055465"/>
+            <a:off x="17907794" y="28887673"/>
             <a:ext cx="6916737" cy="525463"/>
           </a:xfrm>
           <a:prstGeom prst="rect">
@@ -7274,7 +7311,7 @@
         </p:nvSpPr>
         <p:spPr bwMode="auto">
           <a:xfrm>
-            <a:off x="15165388" y="29431703"/>
+            <a:off x="15165388" y="29343497"/>
             <a:ext cx="12401550" cy="2273071"/>
           </a:xfrm>
           <a:prstGeom prst="rect">
@@ -7410,227 +7447,15 @@
             <a:pPr algn="just"/>
             <a:r>
               <a:rPr lang="pt-BR" altLang="pt-BR" sz="2600" dirty="0">
-                <a:highlight>
-                  <a:srgbClr val="FFFF00"/>
-                </a:highlight>
-                <a:latin typeface="Arial"/>
-                <a:cs typeface="Arial"/>
-              </a:rPr>
-              <a:t>Relembre seu objetivo geral inicial e resuma seus principais aprendizados e os resultados que atingiu. Seja breve! </a:t>
-            </a:r>
-          </a:p>
-          <a:p>
-            <a:pPr algn="just"/>
-            <a:r>
-              <a:rPr lang="pt-BR" sz="2600" dirty="0" err="1">
-                <a:latin typeface="Arial"/>
-                <a:cs typeface="Arial"/>
-              </a:rPr>
-              <a:t>Lorem</a:t>
-            </a:r>
-            <a:r>
-              <a:rPr lang="pt-BR" sz="2600" dirty="0">
-                <a:latin typeface="Arial"/>
-                <a:cs typeface="Arial"/>
-              </a:rPr>
-              <a:t> ipsum tempus </a:t>
-            </a:r>
-            <a:r>
-              <a:rPr lang="pt-BR" sz="2600" dirty="0" err="1">
-                <a:latin typeface="Arial"/>
-                <a:cs typeface="Arial"/>
-              </a:rPr>
-              <a:t>quam</a:t>
-            </a:r>
-            <a:r>
-              <a:rPr lang="pt-BR" sz="2600" dirty="0">
-                <a:latin typeface="Arial"/>
-                <a:cs typeface="Arial"/>
-              </a:rPr>
-              <a:t> </a:t>
-            </a:r>
-            <a:r>
-              <a:rPr lang="pt-BR" sz="2600" dirty="0" err="1">
-                <a:latin typeface="Arial"/>
-                <a:cs typeface="Arial"/>
-              </a:rPr>
-              <a:t>proin</a:t>
-            </a:r>
-            <a:r>
-              <a:rPr lang="pt-BR" sz="2600" dirty="0">
-                <a:latin typeface="Arial"/>
-                <a:cs typeface="Arial"/>
-              </a:rPr>
-              <a:t> </a:t>
-            </a:r>
-            <a:r>
-              <a:rPr lang="pt-BR" sz="2600" dirty="0" err="1">
-                <a:latin typeface="Arial"/>
-                <a:cs typeface="Arial"/>
-              </a:rPr>
-              <a:t>ligula</a:t>
-            </a:r>
-            <a:r>
-              <a:rPr lang="pt-BR" sz="2600" dirty="0">
-                <a:latin typeface="Arial"/>
-                <a:cs typeface="Arial"/>
-              </a:rPr>
-              <a:t> fames </a:t>
-            </a:r>
-            <a:r>
-              <a:rPr lang="pt-BR" sz="2600" dirty="0" err="1">
-                <a:latin typeface="Arial"/>
-                <a:cs typeface="Arial"/>
-              </a:rPr>
-              <a:t>pulvinar</a:t>
-            </a:r>
-            <a:r>
-              <a:rPr lang="pt-BR" sz="2600" dirty="0">
-                <a:latin typeface="Arial"/>
-                <a:cs typeface="Arial"/>
-              </a:rPr>
-              <a:t>, </a:t>
-            </a:r>
-            <a:r>
-              <a:rPr lang="pt-BR" sz="2600" dirty="0" err="1">
-                <a:latin typeface="Arial"/>
-                <a:cs typeface="Arial"/>
-              </a:rPr>
-              <a:t>sodales</a:t>
-            </a:r>
-            <a:r>
-              <a:rPr lang="pt-BR" sz="2600" dirty="0">
-                <a:latin typeface="Arial"/>
-                <a:cs typeface="Arial"/>
-              </a:rPr>
-              <a:t> </a:t>
-            </a:r>
-            <a:r>
-              <a:rPr lang="pt-BR" sz="2600" dirty="0" err="1">
-                <a:latin typeface="Arial"/>
-                <a:cs typeface="Arial"/>
-              </a:rPr>
-              <a:t>taciti</a:t>
-            </a:r>
-            <a:r>
-              <a:rPr lang="pt-BR" sz="2600" dirty="0">
-                <a:latin typeface="Arial"/>
-                <a:cs typeface="Arial"/>
-              </a:rPr>
-              <a:t> mi tempus </a:t>
-            </a:r>
-            <a:r>
-              <a:rPr lang="pt-BR" sz="2600" dirty="0" err="1">
-                <a:latin typeface="Arial"/>
-                <a:cs typeface="Arial"/>
-              </a:rPr>
-              <a:t>ligula</a:t>
-            </a:r>
-            <a:r>
-              <a:rPr lang="pt-BR" sz="2600" dirty="0">
-                <a:latin typeface="Arial"/>
-                <a:cs typeface="Arial"/>
-              </a:rPr>
-              <a:t> </a:t>
-            </a:r>
-            <a:r>
-              <a:rPr lang="pt-BR" sz="2600" dirty="0" err="1">
-                <a:latin typeface="Arial"/>
-                <a:cs typeface="Arial"/>
-              </a:rPr>
-              <a:t>potenti</a:t>
-            </a:r>
-            <a:r>
-              <a:rPr lang="pt-BR" sz="2600" dirty="0">
-                <a:latin typeface="Arial"/>
-                <a:cs typeface="Arial"/>
-              </a:rPr>
-              <a:t>, </a:t>
-            </a:r>
-            <a:r>
-              <a:rPr lang="pt-BR" sz="2600" dirty="0" err="1">
-                <a:latin typeface="Arial"/>
-                <a:cs typeface="Arial"/>
-              </a:rPr>
-              <a:t>interdum</a:t>
-            </a:r>
-            <a:r>
-              <a:rPr lang="pt-BR" sz="2600" dirty="0">
-                <a:latin typeface="Arial"/>
-                <a:cs typeface="Arial"/>
-              </a:rPr>
-              <a:t> </a:t>
-            </a:r>
-            <a:r>
-              <a:rPr lang="pt-BR" sz="2600" dirty="0" err="1">
-                <a:latin typeface="Arial"/>
-                <a:cs typeface="Arial"/>
-              </a:rPr>
-              <a:t>dolor</a:t>
-            </a:r>
-            <a:r>
-              <a:rPr lang="pt-BR" sz="2600" dirty="0">
-                <a:latin typeface="Arial"/>
-                <a:cs typeface="Arial"/>
-              </a:rPr>
-              <a:t> </a:t>
-            </a:r>
-            <a:r>
-              <a:rPr lang="pt-BR" sz="2600" dirty="0" err="1">
-                <a:latin typeface="Arial"/>
-                <a:cs typeface="Arial"/>
-              </a:rPr>
-              <a:t>iaculis</a:t>
-            </a:r>
-            <a:r>
-              <a:rPr lang="pt-BR" sz="2600" dirty="0">
-                <a:latin typeface="Arial"/>
-                <a:cs typeface="Arial"/>
-              </a:rPr>
-              <a:t> </a:t>
-            </a:r>
-            <a:r>
-              <a:rPr lang="pt-BR" sz="2600" dirty="0" err="1">
-                <a:latin typeface="Arial"/>
-                <a:cs typeface="Arial"/>
-              </a:rPr>
-              <a:t>tellus</a:t>
-            </a:r>
-            <a:r>
-              <a:rPr lang="pt-BR" sz="2600" dirty="0">
-                <a:latin typeface="Arial"/>
-                <a:cs typeface="Arial"/>
-              </a:rPr>
-              <a:t> gravida </a:t>
-            </a:r>
-            <a:r>
-              <a:rPr lang="pt-BR" sz="2600" dirty="0" err="1">
-                <a:latin typeface="Arial"/>
-                <a:cs typeface="Arial"/>
-              </a:rPr>
-              <a:t>auctor</a:t>
-            </a:r>
-            <a:r>
-              <a:rPr lang="pt-BR" sz="2600" dirty="0">
-                <a:latin typeface="Arial"/>
-                <a:cs typeface="Arial"/>
-              </a:rPr>
-              <a:t>. </a:t>
-            </a:r>
-            <a:r>
-              <a:rPr lang="pt-BR" sz="2600" dirty="0" err="1">
-                <a:latin typeface="Arial"/>
-                <a:cs typeface="Arial"/>
-              </a:rPr>
-              <a:t>sapien</a:t>
-            </a:r>
-            <a:r>
-              <a:rPr lang="pt-BR" sz="2600" dirty="0">
-                <a:latin typeface="Arial"/>
-                <a:cs typeface="Arial"/>
-              </a:rPr>
-              <a:t> habitasse.</a:t>
-            </a:r>
+                <a:latin typeface="Arial"/>
+                <a:cs typeface="Arial"/>
+              </a:rPr>
+              <a:t>O objetivo de desenvolver uma aplicação para gerenciamento de consultórios médicos capaz de organizar agendamentos, consultas e prontuários com histórico médico digitalmente foi alcançado. Durante o processo tive a oportunidade de aprender sobre arquitetura, conteinerização, orquestração, segurança e como aplicar esses conceitos em uma aplicação real.</a:t>
+            </a:r>
+            <a:endParaRPr lang="pt-BR" sz="2600" dirty="0">
+              <a:latin typeface="Arial"/>
+              <a:cs typeface="Arial"/>
+            </a:endParaRPr>
           </a:p>
         </p:txBody>
       </p:sp>
@@ -8513,7 +8338,7 @@
         <p:spPr bwMode="auto">
           <a:xfrm>
             <a:off x="14934957" y="32293251"/>
-            <a:ext cx="12459430" cy="1503630"/>
+            <a:ext cx="12459430" cy="1811406"/>
           </a:xfrm>
           <a:prstGeom prst="rect">
             <a:avLst/>
@@ -8554,39 +8379,107 @@
                 <a:latin typeface="Arial"/>
                 <a:cs typeface="Arial"/>
               </a:rPr>
-              <a:t>BARBI, Ivo; MARTINS, </a:t>
+              <a:t>Documentação oficial Node.js - </a:t>
+            </a:r>
+            <a:r>
+              <a:rPr lang="pt-BR" altLang="pt-BR" sz="2000" dirty="0">
+                <a:solidFill>
+                  <a:srgbClr val="000099"/>
+                </a:solidFill>
+                <a:latin typeface="Arial"/>
+                <a:cs typeface="Arial"/>
+                <a:hlinkClick r:id="rId4">
+                  <a:extLst>
+                    <a:ext uri="{A12FA001-AC4F-418D-AE19-62706E023703}">
+                      <ahyp:hlinkClr xmlns:ahyp="http://schemas.microsoft.com/office/drawing/2018/hyperlinkcolor" val="tx"/>
+                    </a:ext>
+                  </a:extLst>
+                </a:hlinkClick>
+              </a:rPr>
+              <a:t>https://nodejs.org/docs/latest/api/</a:t>
+            </a:r>
+            <a:endParaRPr lang="pt-BR" altLang="pt-BR" sz="2000" dirty="0">
+              <a:solidFill>
+                <a:srgbClr val="000099"/>
+              </a:solidFill>
+              <a:latin typeface="Arial"/>
+              <a:cs typeface="Arial"/>
+            </a:endParaRPr>
+          </a:p>
+          <a:p>
+            <a:pPr algn="just"/>
+            <a:r>
+              <a:rPr lang="pt-BR" altLang="pt-BR" sz="2000" dirty="0">
+                <a:latin typeface="Arial"/>
+                <a:cs typeface="Arial"/>
+              </a:rPr>
+              <a:t>Documentação oficial </a:t>
             </a:r>
             <a:r>
               <a:rPr lang="pt-BR" altLang="pt-BR" sz="2000" dirty="0" err="1">
                 <a:latin typeface="Arial"/>
                 <a:cs typeface="Arial"/>
               </a:rPr>
-              <a:t>Denizar</a:t>
+              <a:t>JavaScript</a:t>
             </a:r>
             <a:r>
               <a:rPr lang="pt-BR" altLang="pt-BR" sz="2000" dirty="0">
                 <a:latin typeface="Arial"/>
                 <a:cs typeface="Arial"/>
               </a:rPr>
-              <a:t> Cruz. </a:t>
-            </a:r>
-            <a:r>
-              <a:rPr lang="pt-BR" altLang="pt-BR" sz="2000" b="1" dirty="0">
-                <a:latin typeface="Arial"/>
-                <a:cs typeface="Arial"/>
-              </a:rPr>
-              <a:t>Introdução ao estudo dos conversores CC-CA</a:t>
+              <a:t> - </a:t>
             </a:r>
             <a:r>
               <a:rPr lang="pt-BR" altLang="pt-BR" sz="2000" dirty="0">
-                <a:latin typeface="Arial"/>
-                <a:cs typeface="Arial"/>
-              </a:rPr>
-              <a:t>. Florianópolis, maio/2005. p.311, p312.</a:t>
-            </a:r>
+                <a:solidFill>
+                  <a:srgbClr val="000099"/>
+                </a:solidFill>
+                <a:latin typeface="Arial"/>
+                <a:cs typeface="Arial"/>
+                <a:hlinkClick r:id="rId5">
+                  <a:extLst>
+                    <a:ext uri="{A12FA001-AC4F-418D-AE19-62706E023703}">
+                      <ahyp:hlinkClr xmlns:ahyp="http://schemas.microsoft.com/office/drawing/2018/hyperlinkcolor" val="tx"/>
+                    </a:ext>
+                  </a:extLst>
+                </a:hlinkClick>
+              </a:rPr>
+              <a:t>https://developer.mozilla.org/en-US/docs/Web/JavaScript</a:t>
+            </a:r>
+            <a:endParaRPr lang="pt-BR" altLang="pt-BR" sz="2000" dirty="0">
+              <a:solidFill>
+                <a:srgbClr val="000099"/>
+              </a:solidFill>
+              <a:latin typeface="Arial"/>
+              <a:cs typeface="Arial"/>
+            </a:endParaRPr>
           </a:p>
           <a:p>
             <a:pPr algn="just"/>
+            <a:r>
+              <a:rPr lang="pt-BR" altLang="pt-BR" sz="2000" dirty="0">
+                <a:latin typeface="Arial"/>
+                <a:cs typeface="Arial"/>
+              </a:rPr>
+              <a:t>Documentação oficial Docker - </a:t>
+            </a:r>
+            <a:r>
+              <a:rPr lang="pt-BR" altLang="pt-BR" sz="2000" dirty="0">
+                <a:solidFill>
+                  <a:srgbClr val="000099"/>
+                </a:solidFill>
+                <a:latin typeface="Arial"/>
+                <a:cs typeface="Arial"/>
+                <a:hlinkClick r:id="rId6">
+                  <a:extLst>
+                    <a:ext uri="{A12FA001-AC4F-418D-AE19-62706E023703}">
+                      <ahyp:hlinkClr xmlns:ahyp="http://schemas.microsoft.com/office/drawing/2018/hyperlinkcolor" val="tx"/>
+                    </a:ext>
+                  </a:extLst>
+                </a:hlinkClick>
+              </a:rPr>
+              <a:t>https://docs.docker.com/manuals/</a:t>
+            </a:r>
             <a:endParaRPr lang="pt-BR" altLang="pt-BR" sz="2000" dirty="0">
               <a:latin typeface="Arial"/>
               <a:cs typeface="Arial"/>
@@ -8594,7 +8487,58 @@
           </a:p>
           <a:p>
             <a:pPr algn="just"/>
+            <a:r>
+              <a:rPr lang="pt-BR" altLang="pt-BR" sz="2000" dirty="0">
+                <a:latin typeface="Arial"/>
+                <a:cs typeface="Arial"/>
+              </a:rPr>
+              <a:t>Documentação oficial </a:t>
+            </a:r>
+            <a:r>
+              <a:rPr lang="pt-BR" altLang="pt-BR" sz="2000" dirty="0" err="1">
+                <a:latin typeface="Arial"/>
+                <a:cs typeface="Arial"/>
+              </a:rPr>
+              <a:t>React</a:t>
+            </a:r>
+            <a:r>
+              <a:rPr lang="pt-BR" altLang="pt-BR" sz="2000" dirty="0">
+                <a:latin typeface="Arial"/>
+                <a:cs typeface="Arial"/>
+              </a:rPr>
+              <a:t> - </a:t>
+            </a:r>
+            <a:r>
+              <a:rPr lang="pt-BR" altLang="pt-BR" sz="2000" dirty="0">
+                <a:solidFill>
+                  <a:srgbClr val="000099"/>
+                </a:solidFill>
+                <a:latin typeface="Arial"/>
+                <a:cs typeface="Arial"/>
+                <a:hlinkClick r:id="rId7">
+                  <a:extLst>
+                    <a:ext uri="{A12FA001-AC4F-418D-AE19-62706E023703}">
+                      <ahyp:hlinkClr xmlns:ahyp="http://schemas.microsoft.com/office/drawing/2018/hyperlinkcolor" val="tx"/>
+                    </a:ext>
+                  </a:extLst>
+                </a:hlinkClick>
+              </a:rPr>
+              <a:t>https://react.dev/learn</a:t>
+            </a:r>
             <a:endParaRPr lang="pt-BR" altLang="pt-BR" sz="2000" dirty="0">
+              <a:solidFill>
+                <a:srgbClr val="000099"/>
+              </a:solidFill>
+              <a:latin typeface="Arial"/>
+              <a:cs typeface="Arial"/>
+            </a:endParaRPr>
+          </a:p>
+          <a:p>
+            <a:pPr algn="just"/>
+            <a:endParaRPr lang="pt-BR" altLang="pt-BR" sz="2000" dirty="0">
+              <a:solidFill>
+                <a:srgbClr val="000099"/>
+              </a:solidFill>
               <a:latin typeface="Arial"/>
               <a:cs typeface="Arial"/>
             </a:endParaRPr>
@@ -9883,7 +9827,7 @@
                 </a:solidFill>
                 <a:latin typeface="Arial"/>
                 <a:cs typeface="Arial"/>
-                <a:hlinkClick r:id="rId4">
+                <a:hlinkClick r:id="rId8">
                   <a:extLst>
                     <a:ext uri="{A12FA001-AC4F-418D-AE19-62706E023703}">
                       <ahyp:hlinkClr xmlns:ahyp="http://schemas.microsoft.com/office/drawing/2018/hyperlinkcolor" val="tx"/>
@@ -9995,7 +9939,7 @@
         </p:nvSpPr>
         <p:spPr bwMode="auto">
           <a:xfrm>
-            <a:off x="16990215" y="24446953"/>
+            <a:off x="16729073" y="24490279"/>
             <a:ext cx="9274175" cy="307777"/>
           </a:xfrm>
           <a:prstGeom prst="rect">
@@ -10172,7 +10116,7 @@
           <p:nvPr/>
         </p:nvPicPr>
         <p:blipFill>
-          <a:blip r:embed="rId5"/>
+          <a:blip r:embed="rId9"/>
           <a:stretch>
             <a:fillRect/>
           </a:stretch>
@@ -10181,36 +10125,6 @@
           <a:xfrm>
             <a:off x="3790950" y="17817223"/>
             <a:ext cx="9001125" cy="4743450"/>
-          </a:xfrm>
-          <a:prstGeom prst="rect">
-            <a:avLst/>
-          </a:prstGeom>
-        </p:spPr>
-      </p:pic>
-      <p:pic>
-        <p:nvPicPr>
-          <p:cNvPr id="10" name="Imagem 9">
-            <a:extLst>
-              <a:ext uri="{FF2B5EF4-FFF2-40B4-BE49-F238E27FC236}">
-                <a16:creationId xmlns:a16="http://schemas.microsoft.com/office/drawing/2014/main" id="{CBB3471C-3349-113E-FF72-22286C0698C8}"/>
-              </a:ext>
-            </a:extLst>
-          </p:cNvPr>
-          <p:cNvPicPr>
-            <a:picLocks noChangeAspect="1"/>
-          </p:cNvPicPr>
-          <p:nvPr/>
-        </p:nvPicPr>
-        <p:blipFill>
-          <a:blip r:embed="rId6"/>
-          <a:stretch>
-            <a:fillRect/>
-          </a:stretch>
-        </p:blipFill>
-        <p:spPr>
-          <a:xfrm>
-            <a:off x="3437914" y="25756198"/>
-            <a:ext cx="8754697" cy="7859222"/>
           </a:xfrm>
           <a:prstGeom prst="rect">
             <a:avLst/>
@@ -10232,7 +10146,7 @@
           <p:nvPr/>
         </p:nvPicPr>
         <p:blipFill>
-          <a:blip r:embed="rId7"/>
+          <a:blip r:embed="rId10"/>
           <a:stretch>
             <a:fillRect/>
           </a:stretch>
@@ -10262,7 +10176,7 @@
           <p:nvPr/>
         </p:nvPicPr>
         <p:blipFill>
-          <a:blip r:embed="rId8">
+          <a:blip r:embed="rId11">
             <a:extLst>
               <a:ext uri="{28A0092B-C50C-407E-A947-70E740481C1C}">
                 <a14:useLocalDpi xmlns:a14="http://schemas.microsoft.com/office/drawing/2010/main" val="0"/>
@@ -10276,8 +10190,38 @@
         </p:blipFill>
         <p:spPr>
           <a:xfrm>
-            <a:off x="19730392" y="24745219"/>
+            <a:off x="19833051" y="24704094"/>
             <a:ext cx="3066221" cy="4147743"/>
+          </a:xfrm>
+          <a:prstGeom prst="rect">
+            <a:avLst/>
+          </a:prstGeom>
+        </p:spPr>
+      </p:pic>
+      <p:pic>
+        <p:nvPicPr>
+          <p:cNvPr id="3" name="Imagem 2">
+            <a:extLst>
+              <a:ext uri="{FF2B5EF4-FFF2-40B4-BE49-F238E27FC236}">
+                <a16:creationId xmlns:a16="http://schemas.microsoft.com/office/drawing/2014/main" id="{E81EE3ED-8E46-6965-9E8E-B177A5F40537}"/>
+              </a:ext>
+            </a:extLst>
+          </p:cNvPr>
+          <p:cNvPicPr>
+            <a:picLocks noChangeAspect="1"/>
+          </p:cNvPicPr>
+          <p:nvPr/>
+        </p:nvPicPr>
+        <p:blipFill>
+          <a:blip r:embed="rId12"/>
+          <a:stretch>
+            <a:fillRect/>
+          </a:stretch>
+        </p:blipFill>
+        <p:spPr>
+          <a:xfrm>
+            <a:off x="2941114" y="25876736"/>
+            <a:ext cx="8485869" cy="7920145"/>
           </a:xfrm>
           <a:prstGeom prst="rect">
             <a:avLst/>

</xml_diff>